<commit_message>
Added Perry's recent updates
</commit_message>
<xml_diff>
--- a/Model_Versions/Uncertainty_SLR_GEV/Sensitivity_Analysis/Sobol/SALib/Output/Figures/Sobol_setup.pptx
+++ b/Model_Versions/Uncertainty_SLR_GEV/Sensitivity_Analysis/Sobol/SALib/Output/Figures/Sobol_setup.pptx
@@ -7,6 +7,8 @@
   <p:sldIdLst>
     <p:sldId id="257" r:id="rId2"/>
     <p:sldId id="258" r:id="rId3"/>
+    <p:sldId id="259" r:id="rId4"/>
+    <p:sldId id="260" r:id="rId5"/>
   </p:sldIdLst>
   <p:sldSz cx="5715000" cy="7315200"/>
   <p:notesSz cx="6858000" cy="9144000"/>
@@ -105,6 +107,22 @@
       </a:defRPr>
     </a:lvl9pPr>
   </p:defaultTextStyle>
+  <p:extLst>
+    <p:ext uri="{EFAFB233-063F-42B5-8137-9DF3F51BA10A}">
+      <p15:sldGuideLst xmlns:p15="http://schemas.microsoft.com/office/powerpoint/2012/main">
+        <p15:guide id="1" orient="horz" pos="1992" userDrawn="1">
+          <p15:clr>
+            <a:srgbClr val="A4A3A4"/>
+          </p15:clr>
+        </p15:guide>
+        <p15:guide id="2" pos="1992" userDrawn="1">
+          <p15:clr>
+            <a:srgbClr val="A4A3A4"/>
+          </p15:clr>
+        </p15:guide>
+      </p15:sldGuideLst>
+    </p:ext>
+  </p:extLst>
 </p:presentation>
 </file>
 
@@ -289,7 +307,7 @@
           <a:p>
             <a:fld id="{3C187E5C-C850-8043-9845-6806D25816AE}" type="datetimeFigureOut">
               <a:rPr lang="en-US" smtClean="0"/>
-              <a:t>7/10/16</a:t>
+              <a:t>4/4/2017</a:t>
             </a:fld>
             <a:endParaRPr lang="en-US"/>
           </a:p>
@@ -459,7 +477,7 @@
           <a:p>
             <a:fld id="{3C187E5C-C850-8043-9845-6806D25816AE}" type="datetimeFigureOut">
               <a:rPr lang="en-US" smtClean="0"/>
-              <a:t>7/10/16</a:t>
+              <a:t>4/4/2017</a:t>
             </a:fld>
             <a:endParaRPr lang="en-US"/>
           </a:p>
@@ -639,7 +657,7 @@
           <a:p>
             <a:fld id="{3C187E5C-C850-8043-9845-6806D25816AE}" type="datetimeFigureOut">
               <a:rPr lang="en-US" smtClean="0"/>
-              <a:t>7/10/16</a:t>
+              <a:t>4/4/2017</a:t>
             </a:fld>
             <a:endParaRPr lang="en-US"/>
           </a:p>
@@ -809,7 +827,7 @@
           <a:p>
             <a:fld id="{3C187E5C-C850-8043-9845-6806D25816AE}" type="datetimeFigureOut">
               <a:rPr lang="en-US" smtClean="0"/>
-              <a:t>7/10/16</a:t>
+              <a:t>4/4/2017</a:t>
             </a:fld>
             <a:endParaRPr lang="en-US"/>
           </a:p>
@@ -1055,7 +1073,7 @@
           <a:p>
             <a:fld id="{3C187E5C-C850-8043-9845-6806D25816AE}" type="datetimeFigureOut">
               <a:rPr lang="en-US" smtClean="0"/>
-              <a:t>7/10/16</a:t>
+              <a:t>4/4/2017</a:t>
             </a:fld>
             <a:endParaRPr lang="en-US"/>
           </a:p>
@@ -1343,7 +1361,7 @@
           <a:p>
             <a:fld id="{3C187E5C-C850-8043-9845-6806D25816AE}" type="datetimeFigureOut">
               <a:rPr lang="en-US" smtClean="0"/>
-              <a:t>7/10/16</a:t>
+              <a:t>4/4/2017</a:t>
             </a:fld>
             <a:endParaRPr lang="en-US"/>
           </a:p>
@@ -1770,7 +1788,7 @@
           <a:p>
             <a:fld id="{3C187E5C-C850-8043-9845-6806D25816AE}" type="datetimeFigureOut">
               <a:rPr lang="en-US" smtClean="0"/>
-              <a:t>7/10/16</a:t>
+              <a:t>4/4/2017</a:t>
             </a:fld>
             <a:endParaRPr lang="en-US"/>
           </a:p>
@@ -1888,7 +1906,7 @@
           <a:p>
             <a:fld id="{3C187E5C-C850-8043-9845-6806D25816AE}" type="datetimeFigureOut">
               <a:rPr lang="en-US" smtClean="0"/>
-              <a:t>7/10/16</a:t>
+              <a:t>4/4/2017</a:t>
             </a:fld>
             <a:endParaRPr lang="en-US"/>
           </a:p>
@@ -1983,7 +2001,7 @@
           <a:p>
             <a:fld id="{3C187E5C-C850-8043-9845-6806D25816AE}" type="datetimeFigureOut">
               <a:rPr lang="en-US" smtClean="0"/>
-              <a:t>7/10/16</a:t>
+              <a:t>4/4/2017</a:t>
             </a:fld>
             <a:endParaRPr lang="en-US"/>
           </a:p>
@@ -2260,7 +2278,7 @@
           <a:p>
             <a:fld id="{3C187E5C-C850-8043-9845-6806D25816AE}" type="datetimeFigureOut">
               <a:rPr lang="en-US" smtClean="0"/>
-              <a:t>7/10/16</a:t>
+              <a:t>4/4/2017</a:t>
             </a:fld>
             <a:endParaRPr lang="en-US"/>
           </a:p>
@@ -2513,7 +2531,7 @@
           <a:p>
             <a:fld id="{3C187E5C-C850-8043-9845-6806D25816AE}" type="datetimeFigureOut">
               <a:rPr lang="en-US" smtClean="0"/>
-              <a:t>7/10/16</a:t>
+              <a:t>4/4/2017</a:t>
             </a:fld>
             <a:endParaRPr lang="en-US"/>
           </a:p>
@@ -2726,7 +2744,7 @@
           <a:p>
             <a:fld id="{3C187E5C-C850-8043-9845-6806D25816AE}" type="datetimeFigureOut">
               <a:rPr lang="en-US" smtClean="0"/>
-              <a:t>7/10/16</a:t>
+              <a:t>4/4/2017</a:t>
             </a:fld>
             <a:endParaRPr lang="en-US"/>
           </a:p>
@@ -4367,14 +4385,7 @@
                   <a:latin typeface="Helvetica"/>
                   <a:cs typeface="Helvetica"/>
                 </a:rPr>
-                <a:t>95</a:t>
-              </a:r>
-              <a:r>
-                <a:rPr lang="en-US" sz="1000" dirty="0" smtClean="0">
-                  <a:latin typeface="Helvetica"/>
-                  <a:cs typeface="Helvetica"/>
-                </a:rPr>
-                <a:t>%</a:t>
+                <a:t>95%</a:t>
               </a:r>
               <a:endParaRPr lang="en-US" sz="1000" dirty="0">
                 <a:latin typeface="Helvetica"/>
@@ -4871,14 +4882,7 @@
                   <a:latin typeface="Helvetica"/>
                   <a:cs typeface="Helvetica"/>
                 </a:rPr>
-                <a:t>29</a:t>
-              </a:r>
-              <a:r>
-                <a:rPr lang="en-US" sz="1000" dirty="0" smtClean="0">
-                  <a:latin typeface="Helvetica"/>
-                  <a:cs typeface="Helvetica"/>
-                </a:rPr>
-                <a:t>%</a:t>
+                <a:t>29%</a:t>
               </a:r>
               <a:endParaRPr lang="en-US" sz="1000" dirty="0">
                 <a:latin typeface="Helvetica"/>
@@ -5131,6 +5135,1144 @@
     <p:extLst>
       <p:ext uri="{BB962C8B-B14F-4D97-AF65-F5344CB8AC3E}">
         <p14:creationId xmlns:p14="http://schemas.microsoft.com/office/powerpoint/2010/main" val="1694377901"/>
+      </p:ext>
+    </p:extLst>
+  </p:cSld>
+  <p:clrMapOvr>
+    <a:masterClrMapping/>
+  </p:clrMapOvr>
+</p:sld>
+</file>
+
+<file path=ppt/slides/slide3.xml><?xml version="1.0" encoding="utf-8"?>
+<p:sld xmlns:a="http://schemas.openxmlformats.org/drawingml/2006/main" xmlns:r="http://schemas.openxmlformats.org/officeDocument/2006/relationships" xmlns:p="http://schemas.openxmlformats.org/presentationml/2006/main">
+  <p:cSld>
+    <p:spTree>
+      <p:nvGrpSpPr>
+        <p:cNvPr id="1" name=""/>
+        <p:cNvGrpSpPr/>
+        <p:nvPr/>
+      </p:nvGrpSpPr>
+      <p:grpSpPr>
+        <a:xfrm>
+          <a:off x="0" y="0"/>
+          <a:ext cx="0" cy="0"/>
+          <a:chOff x="0" y="0"/>
+          <a:chExt cx="0" cy="0"/>
+        </a:xfrm>
+      </p:grpSpPr>
+      <p:sp>
+        <p:nvSpPr>
+          <p:cNvPr id="44" name="TextBox 43"/>
+          <p:cNvSpPr txBox="1"/>
+          <p:nvPr/>
+        </p:nvSpPr>
+        <p:spPr>
+          <a:xfrm>
+            <a:off x="10284" y="-41359"/>
+            <a:ext cx="1878264" cy="276999"/>
+          </a:xfrm>
+          <a:prstGeom prst="rect">
+            <a:avLst/>
+          </a:prstGeom>
+          <a:noFill/>
+        </p:spPr>
+        <p:txBody>
+          <a:bodyPr wrap="none" rtlCol="0">
+            <a:spAutoFit/>
+          </a:bodyPr>
+          <a:lstStyle/>
+          <a:p>
+            <a:r>
+              <a:rPr lang="en-US" sz="1200" dirty="0" smtClean="0">
+                <a:latin typeface="Helvetica"/>
+                <a:cs typeface="Helvetica"/>
+              </a:rPr>
+              <a:t>A. Discounted total costs</a:t>
+            </a:r>
+            <a:endParaRPr lang="en-US" sz="1200" dirty="0">
+              <a:latin typeface="Helvetica"/>
+              <a:cs typeface="Helvetica"/>
+            </a:endParaRPr>
+          </a:p>
+        </p:txBody>
+      </p:sp>
+      <p:sp>
+        <p:nvSpPr>
+          <p:cNvPr id="45" name="TextBox 44"/>
+          <p:cNvSpPr txBox="1"/>
+          <p:nvPr/>
+        </p:nvSpPr>
+        <p:spPr>
+          <a:xfrm>
+            <a:off x="2985072" y="-42848"/>
+            <a:ext cx="1518364" cy="276999"/>
+          </a:xfrm>
+          <a:prstGeom prst="rect">
+            <a:avLst/>
+          </a:prstGeom>
+          <a:noFill/>
+        </p:spPr>
+        <p:txBody>
+          <a:bodyPr wrap="none" rtlCol="0">
+            <a:spAutoFit/>
+          </a:bodyPr>
+          <a:lstStyle/>
+          <a:p>
+            <a:r>
+              <a:rPr lang="en-US" sz="1200" dirty="0" smtClean="0">
+                <a:latin typeface="Helvetica"/>
+                <a:cs typeface="Helvetica"/>
+              </a:rPr>
+              <a:t>B. </a:t>
+            </a:r>
+            <a:r>
+              <a:rPr lang="en-US" sz="1200" smtClean="0">
+                <a:latin typeface="Helvetica"/>
+                <a:cs typeface="Helvetica"/>
+              </a:rPr>
+              <a:t>Flood probability</a:t>
+            </a:r>
+            <a:endParaRPr lang="en-US" sz="1200" dirty="0">
+              <a:latin typeface="Helvetica"/>
+              <a:cs typeface="Helvetica"/>
+            </a:endParaRPr>
+          </a:p>
+        </p:txBody>
+      </p:sp>
+      <p:sp>
+        <p:nvSpPr>
+          <p:cNvPr id="46" name="TextBox 45"/>
+          <p:cNvSpPr txBox="1"/>
+          <p:nvPr/>
+        </p:nvSpPr>
+        <p:spPr>
+          <a:xfrm>
+            <a:off x="10284" y="2855708"/>
+            <a:ext cx="1535922" cy="276999"/>
+          </a:xfrm>
+          <a:prstGeom prst="rect">
+            <a:avLst/>
+          </a:prstGeom>
+          <a:noFill/>
+        </p:spPr>
+        <p:txBody>
+          <a:bodyPr wrap="none" rtlCol="0">
+            <a:spAutoFit/>
+          </a:bodyPr>
+          <a:lstStyle/>
+          <a:p>
+            <a:r>
+              <a:rPr lang="en-US" sz="1200" dirty="0" smtClean="0">
+                <a:latin typeface="Helvetica"/>
+                <a:cs typeface="Helvetica"/>
+              </a:rPr>
+              <a:t>C. Investment costs</a:t>
+            </a:r>
+            <a:endParaRPr lang="en-US" sz="1200" dirty="0">
+              <a:latin typeface="Helvetica"/>
+              <a:cs typeface="Helvetica"/>
+            </a:endParaRPr>
+          </a:p>
+        </p:txBody>
+      </p:sp>
+      <p:grpSp>
+        <p:nvGrpSpPr>
+          <p:cNvPr id="54" name="Group 53"/>
+          <p:cNvGrpSpPr/>
+          <p:nvPr/>
+        </p:nvGrpSpPr>
+        <p:grpSpPr>
+          <a:xfrm>
+            <a:off x="405846" y="6078638"/>
+            <a:ext cx="4903308" cy="1157041"/>
+            <a:chOff x="512047" y="6078638"/>
+            <a:chExt cx="4903308" cy="1157041"/>
+          </a:xfrm>
+        </p:grpSpPr>
+        <p:sp>
+          <p:nvSpPr>
+            <p:cNvPr id="33" name="Rectangle 32"/>
+            <p:cNvSpPr/>
+            <p:nvPr/>
+          </p:nvSpPr>
+          <p:spPr>
+            <a:xfrm>
+              <a:off x="654567" y="6101729"/>
+              <a:ext cx="4634466" cy="1133950"/>
+            </a:xfrm>
+            <a:prstGeom prst="rect">
+              <a:avLst/>
+            </a:prstGeom>
+            <a:solidFill>
+              <a:schemeClr val="accent1">
+                <a:alpha val="17000"/>
+              </a:schemeClr>
+            </a:solidFill>
+            <a:ln>
+              <a:solidFill>
+                <a:srgbClr val="FFFFFF"/>
+              </a:solidFill>
+            </a:ln>
+            <a:effectLst/>
+          </p:spPr>
+          <p:style>
+            <a:lnRef idx="1">
+              <a:schemeClr val="accent1"/>
+            </a:lnRef>
+            <a:fillRef idx="3">
+              <a:schemeClr val="accent1"/>
+            </a:fillRef>
+            <a:effectRef idx="2">
+              <a:schemeClr val="accent1"/>
+            </a:effectRef>
+            <a:fontRef idx="minor">
+              <a:schemeClr val="lt1"/>
+            </a:fontRef>
+          </p:style>
+          <p:txBody>
+            <a:bodyPr rtlCol="0" anchor="ctr"/>
+            <a:lstStyle/>
+            <a:p>
+              <a:pPr algn="ctr"/>
+              <a:endParaRPr lang="en-US">
+                <a:latin typeface="Helvetica"/>
+                <a:cs typeface="Helvetica"/>
+              </a:endParaRPr>
+            </a:p>
+          </p:txBody>
+        </p:sp>
+        <p:sp>
+          <p:nvSpPr>
+            <p:cNvPr id="34" name="TextBox 33"/>
+            <p:cNvSpPr txBox="1"/>
+            <p:nvPr/>
+          </p:nvSpPr>
+          <p:spPr>
+            <a:xfrm>
+              <a:off x="2404390" y="6291929"/>
+              <a:ext cx="1134820" cy="276999"/>
+            </a:xfrm>
+            <a:prstGeom prst="rect">
+              <a:avLst/>
+            </a:prstGeom>
+            <a:noFill/>
+          </p:spPr>
+          <p:txBody>
+            <a:bodyPr wrap="square" rtlCol="0">
+              <a:spAutoFit/>
+            </a:bodyPr>
+            <a:lstStyle/>
+            <a:p>
+              <a:pPr algn="ctr"/>
+              <a:r>
+                <a:rPr lang="en-US" sz="1200" i="1" dirty="0" smtClean="0">
+                  <a:latin typeface="Helvetica"/>
+                  <a:cs typeface="Helvetica"/>
+                </a:rPr>
+                <a:t>Total-Order</a:t>
+              </a:r>
+              <a:endParaRPr lang="en-US" sz="1200" i="1" dirty="0">
+                <a:latin typeface="Helvetica"/>
+                <a:cs typeface="Helvetica"/>
+              </a:endParaRPr>
+            </a:p>
+          </p:txBody>
+        </p:sp>
+        <p:sp>
+          <p:nvSpPr>
+            <p:cNvPr id="35" name="TextBox 34"/>
+            <p:cNvSpPr txBox="1"/>
+            <p:nvPr/>
+          </p:nvSpPr>
+          <p:spPr>
+            <a:xfrm>
+              <a:off x="2979371" y="6504792"/>
+              <a:ext cx="441334" cy="246221"/>
+            </a:xfrm>
+            <a:prstGeom prst="rect">
+              <a:avLst/>
+            </a:prstGeom>
+            <a:noFill/>
+          </p:spPr>
+          <p:txBody>
+            <a:bodyPr wrap="none" rtlCol="0">
+              <a:spAutoFit/>
+            </a:bodyPr>
+            <a:lstStyle/>
+            <a:p>
+              <a:r>
+                <a:rPr lang="en-US" sz="1000" dirty="0" smtClean="0">
+                  <a:latin typeface="Helvetica"/>
+                  <a:cs typeface="Helvetica"/>
+                </a:rPr>
+                <a:t>95%</a:t>
+              </a:r>
+              <a:endParaRPr lang="en-US" sz="1000" dirty="0">
+                <a:latin typeface="Helvetica"/>
+                <a:cs typeface="Helvetica"/>
+              </a:endParaRPr>
+            </a:p>
+          </p:txBody>
+        </p:sp>
+        <p:sp>
+          <p:nvSpPr>
+            <p:cNvPr id="36" name="Oval 35"/>
+            <p:cNvSpPr>
+              <a:spLocks noChangeAspect="1"/>
+            </p:cNvSpPr>
+            <p:nvPr/>
+          </p:nvSpPr>
+          <p:spPr>
+            <a:xfrm flipH="1" flipV="1">
+              <a:off x="1202986" y="6894260"/>
+              <a:ext cx="36576" cy="41148"/>
+            </a:xfrm>
+            <a:prstGeom prst="ellipse">
+              <a:avLst/>
+            </a:prstGeom>
+            <a:solidFill>
+              <a:srgbClr val="535353"/>
+            </a:solidFill>
+            <a:ln>
+              <a:noFill/>
+            </a:ln>
+            <a:effectLst/>
+          </p:spPr>
+          <p:style>
+            <a:lnRef idx="1">
+              <a:schemeClr val="accent1"/>
+            </a:lnRef>
+            <a:fillRef idx="3">
+              <a:schemeClr val="accent1"/>
+            </a:fillRef>
+            <a:effectRef idx="2">
+              <a:schemeClr val="accent1"/>
+            </a:effectRef>
+            <a:fontRef idx="minor">
+              <a:schemeClr val="lt1"/>
+            </a:fontRef>
+          </p:style>
+          <p:txBody>
+            <a:bodyPr rtlCol="0" anchor="ctr"/>
+            <a:lstStyle/>
+            <a:p>
+              <a:pPr algn="ctr"/>
+              <a:endParaRPr lang="en-US">
+                <a:latin typeface="Helvetica"/>
+                <a:cs typeface="Helvetica"/>
+              </a:endParaRPr>
+            </a:p>
+          </p:txBody>
+        </p:sp>
+        <p:sp>
+          <p:nvSpPr>
+            <p:cNvPr id="37" name="TextBox 36"/>
+            <p:cNvSpPr txBox="1"/>
+            <p:nvPr/>
+          </p:nvSpPr>
+          <p:spPr>
+            <a:xfrm>
+              <a:off x="512047" y="6299574"/>
+              <a:ext cx="1882890" cy="276999"/>
+            </a:xfrm>
+            <a:prstGeom prst="rect">
+              <a:avLst/>
+            </a:prstGeom>
+            <a:noFill/>
+          </p:spPr>
+          <p:txBody>
+            <a:bodyPr wrap="square" rtlCol="0">
+              <a:spAutoFit/>
+            </a:bodyPr>
+            <a:lstStyle/>
+            <a:p>
+              <a:pPr algn="ctr"/>
+              <a:r>
+                <a:rPr lang="en-US" sz="1200" i="1" dirty="0" smtClean="0">
+                  <a:latin typeface="Helvetica"/>
+                  <a:cs typeface="Helvetica"/>
+                </a:rPr>
+                <a:t>First-Order</a:t>
+              </a:r>
+              <a:endParaRPr lang="en-US" sz="1200" i="1" dirty="0">
+                <a:latin typeface="Helvetica"/>
+                <a:cs typeface="Helvetica"/>
+              </a:endParaRPr>
+            </a:p>
+          </p:txBody>
+        </p:sp>
+        <p:sp>
+          <p:nvSpPr>
+            <p:cNvPr id="38" name="TextBox 37"/>
+            <p:cNvSpPr txBox="1"/>
+            <p:nvPr/>
+          </p:nvSpPr>
+          <p:spPr>
+            <a:xfrm>
+              <a:off x="1049993" y="6507352"/>
+              <a:ext cx="370013" cy="246221"/>
+            </a:xfrm>
+            <a:prstGeom prst="rect">
+              <a:avLst/>
+            </a:prstGeom>
+            <a:noFill/>
+          </p:spPr>
+          <p:txBody>
+            <a:bodyPr wrap="none" rtlCol="0">
+              <a:spAutoFit/>
+            </a:bodyPr>
+            <a:lstStyle/>
+            <a:p>
+              <a:pPr algn="ctr"/>
+              <a:r>
+                <a:rPr lang="en-US" sz="1000" dirty="0" smtClean="0">
+                  <a:latin typeface="Helvetica"/>
+                  <a:cs typeface="Helvetica"/>
+                </a:rPr>
+                <a:t>1%</a:t>
+              </a:r>
+              <a:endParaRPr lang="en-US" sz="1000" dirty="0">
+                <a:latin typeface="Helvetica"/>
+                <a:cs typeface="Helvetica"/>
+              </a:endParaRPr>
+            </a:p>
+          </p:txBody>
+        </p:sp>
+        <p:sp>
+          <p:nvSpPr>
+            <p:cNvPr id="39" name="TextBox 38"/>
+            <p:cNvSpPr txBox="1"/>
+            <p:nvPr/>
+          </p:nvSpPr>
+          <p:spPr>
+            <a:xfrm>
+              <a:off x="3532465" y="6297396"/>
+              <a:ext cx="1882890" cy="276999"/>
+            </a:xfrm>
+            <a:prstGeom prst="rect">
+              <a:avLst/>
+            </a:prstGeom>
+            <a:noFill/>
+          </p:spPr>
+          <p:txBody>
+            <a:bodyPr wrap="square" rtlCol="0">
+              <a:spAutoFit/>
+            </a:bodyPr>
+            <a:lstStyle/>
+            <a:p>
+              <a:pPr algn="ctr"/>
+              <a:r>
+                <a:rPr lang="en-US" sz="1200" i="1" dirty="0" smtClean="0">
+                  <a:latin typeface="Helvetica"/>
+                  <a:cs typeface="Helvetica"/>
+                </a:rPr>
+                <a:t>Second-Order</a:t>
+              </a:r>
+              <a:endParaRPr lang="en-US" sz="1200" i="1" dirty="0">
+                <a:latin typeface="Helvetica"/>
+                <a:cs typeface="Helvetica"/>
+              </a:endParaRPr>
+            </a:p>
+          </p:txBody>
+        </p:sp>
+        <p:sp>
+          <p:nvSpPr>
+            <p:cNvPr id="40" name="TextBox 39"/>
+            <p:cNvSpPr txBox="1"/>
+            <p:nvPr/>
+          </p:nvSpPr>
+          <p:spPr>
+            <a:xfrm>
+              <a:off x="4463216" y="6511049"/>
+              <a:ext cx="441334" cy="246221"/>
+            </a:xfrm>
+            <a:prstGeom prst="rect">
+              <a:avLst/>
+            </a:prstGeom>
+            <a:noFill/>
+          </p:spPr>
+          <p:txBody>
+            <a:bodyPr wrap="none" rtlCol="0">
+              <a:spAutoFit/>
+            </a:bodyPr>
+            <a:lstStyle/>
+            <a:p>
+              <a:r>
+                <a:rPr lang="en-US" sz="1000" dirty="0" smtClean="0">
+                  <a:latin typeface="Helvetica"/>
+                  <a:cs typeface="Helvetica"/>
+                </a:rPr>
+                <a:t>24%</a:t>
+              </a:r>
+              <a:endParaRPr lang="en-US" sz="1000" dirty="0">
+                <a:latin typeface="Helvetica"/>
+                <a:cs typeface="Helvetica"/>
+              </a:endParaRPr>
+            </a:p>
+          </p:txBody>
+        </p:sp>
+        <p:sp>
+          <p:nvSpPr>
+            <p:cNvPr id="41" name="TextBox 40"/>
+            <p:cNvSpPr txBox="1"/>
+            <p:nvPr/>
+          </p:nvSpPr>
+          <p:spPr>
+            <a:xfrm>
+              <a:off x="2104139" y="6078638"/>
+              <a:ext cx="1735322" cy="276999"/>
+            </a:xfrm>
+            <a:prstGeom prst="rect">
+              <a:avLst/>
+            </a:prstGeom>
+            <a:noFill/>
+          </p:spPr>
+          <p:txBody>
+            <a:bodyPr wrap="square" rtlCol="0">
+              <a:spAutoFit/>
+            </a:bodyPr>
+            <a:lstStyle/>
+            <a:p>
+              <a:pPr algn="ctr"/>
+              <a:r>
+                <a:rPr lang="en-US" sz="1200" b="1" dirty="0" smtClean="0">
+                  <a:latin typeface="Helvetica"/>
+                  <a:cs typeface="Helvetica"/>
+                </a:rPr>
+                <a:t>Sensitivities</a:t>
+              </a:r>
+              <a:endParaRPr lang="en-US" sz="1200" b="1" dirty="0">
+                <a:latin typeface="Helvetica"/>
+                <a:cs typeface="Helvetica"/>
+              </a:endParaRPr>
+            </a:p>
+          </p:txBody>
+        </p:sp>
+        <p:sp>
+          <p:nvSpPr>
+            <p:cNvPr id="42" name="Oval 41"/>
+            <p:cNvSpPr>
+              <a:spLocks/>
+            </p:cNvSpPr>
+            <p:nvPr/>
+          </p:nvSpPr>
+          <p:spPr>
+            <a:xfrm>
+              <a:off x="2979371" y="6725138"/>
+              <a:ext cx="390801" cy="393886"/>
+            </a:xfrm>
+            <a:prstGeom prst="ellipse">
+              <a:avLst/>
+            </a:prstGeom>
+            <a:solidFill>
+              <a:schemeClr val="bg1"/>
+            </a:solidFill>
+            <a:ln w="12700" cmpd="sng">
+              <a:solidFill>
+                <a:schemeClr val="tx1"/>
+              </a:solidFill>
+            </a:ln>
+            <a:effectLst/>
+          </p:spPr>
+          <p:style>
+            <a:lnRef idx="1">
+              <a:schemeClr val="accent1"/>
+            </a:lnRef>
+            <a:fillRef idx="3">
+              <a:schemeClr val="accent1"/>
+            </a:fillRef>
+            <a:effectRef idx="2">
+              <a:schemeClr val="accent1"/>
+            </a:effectRef>
+            <a:fontRef idx="minor">
+              <a:schemeClr val="lt1"/>
+            </a:fontRef>
+          </p:style>
+          <p:txBody>
+            <a:bodyPr rtlCol="0" anchor="ctr"/>
+            <a:lstStyle/>
+            <a:p>
+              <a:pPr algn="ctr"/>
+              <a:endParaRPr lang="en-US">
+                <a:latin typeface="Helvetica"/>
+                <a:cs typeface="Helvetica"/>
+              </a:endParaRPr>
+            </a:p>
+          </p:txBody>
+        </p:sp>
+        <p:cxnSp>
+          <p:nvCxnSpPr>
+            <p:cNvPr id="43" name="Straight Connector 42"/>
+            <p:cNvCxnSpPr/>
+            <p:nvPr/>
+          </p:nvCxnSpPr>
+          <p:spPr>
+            <a:xfrm>
+              <a:off x="4505430" y="6926196"/>
+              <a:ext cx="320164" cy="0"/>
+            </a:xfrm>
+            <a:prstGeom prst="line">
+              <a:avLst/>
+            </a:prstGeom>
+            <a:ln w="190500" cmpd="sng">
+              <a:solidFill>
+                <a:srgbClr val="676767"/>
+              </a:solidFill>
+            </a:ln>
+            <a:effectLst/>
+          </p:spPr>
+          <p:style>
+            <a:lnRef idx="2">
+              <a:schemeClr val="accent1"/>
+            </a:lnRef>
+            <a:fillRef idx="0">
+              <a:schemeClr val="accent1"/>
+            </a:fillRef>
+            <a:effectRef idx="1">
+              <a:schemeClr val="accent1"/>
+            </a:effectRef>
+            <a:fontRef idx="minor">
+              <a:schemeClr val="tx1"/>
+            </a:fontRef>
+          </p:style>
+        </p:cxnSp>
+        <p:sp>
+          <p:nvSpPr>
+            <p:cNvPr id="47" name="TextBox 46"/>
+            <p:cNvSpPr txBox="1"/>
+            <p:nvPr/>
+          </p:nvSpPr>
+          <p:spPr>
+            <a:xfrm>
+              <a:off x="1439323" y="6507235"/>
+              <a:ext cx="441334" cy="246221"/>
+            </a:xfrm>
+            <a:prstGeom prst="rect">
+              <a:avLst/>
+            </a:prstGeom>
+            <a:noFill/>
+          </p:spPr>
+          <p:txBody>
+            <a:bodyPr wrap="none" rtlCol="0">
+              <a:spAutoFit/>
+            </a:bodyPr>
+            <a:lstStyle/>
+            <a:p>
+              <a:r>
+                <a:rPr lang="en-US" sz="1000" dirty="0" smtClean="0">
+                  <a:latin typeface="Helvetica"/>
+                  <a:cs typeface="Helvetica"/>
+                </a:rPr>
+                <a:t>99%</a:t>
+              </a:r>
+              <a:endParaRPr lang="en-US" sz="1000" dirty="0">
+                <a:latin typeface="Helvetica"/>
+                <a:cs typeface="Helvetica"/>
+              </a:endParaRPr>
+            </a:p>
+          </p:txBody>
+        </p:sp>
+        <p:sp>
+          <p:nvSpPr>
+            <p:cNvPr id="48" name="Oval 47"/>
+            <p:cNvSpPr>
+              <a:spLocks/>
+            </p:cNvSpPr>
+            <p:nvPr/>
+          </p:nvSpPr>
+          <p:spPr>
+            <a:xfrm>
+              <a:off x="1429484" y="6718296"/>
+              <a:ext cx="420624" cy="420624"/>
+            </a:xfrm>
+            <a:prstGeom prst="ellipse">
+              <a:avLst/>
+            </a:prstGeom>
+            <a:solidFill>
+              <a:srgbClr val="676767"/>
+            </a:solidFill>
+            <a:ln>
+              <a:noFill/>
+            </a:ln>
+            <a:effectLst/>
+          </p:spPr>
+          <p:style>
+            <a:lnRef idx="1">
+              <a:schemeClr val="accent1"/>
+            </a:lnRef>
+            <a:fillRef idx="3">
+              <a:schemeClr val="accent1"/>
+            </a:fillRef>
+            <a:effectRef idx="2">
+              <a:schemeClr val="accent1"/>
+            </a:effectRef>
+            <a:fontRef idx="minor">
+              <a:schemeClr val="lt1"/>
+            </a:fontRef>
+          </p:style>
+          <p:txBody>
+            <a:bodyPr rtlCol="0" anchor="ctr"/>
+            <a:lstStyle/>
+            <a:p>
+              <a:pPr algn="ctr"/>
+              <a:endParaRPr lang="en-US">
+                <a:latin typeface="Helvetica"/>
+                <a:cs typeface="Helvetica"/>
+              </a:endParaRPr>
+            </a:p>
+          </p:txBody>
+        </p:sp>
+        <p:sp>
+          <p:nvSpPr>
+            <p:cNvPr id="49" name="Oval 48"/>
+            <p:cNvSpPr>
+              <a:spLocks/>
+            </p:cNvSpPr>
+            <p:nvPr/>
+          </p:nvSpPr>
+          <p:spPr>
+            <a:xfrm flipV="1">
+              <a:off x="2638627" y="6827026"/>
+              <a:ext cx="146304" cy="146304"/>
+            </a:xfrm>
+            <a:prstGeom prst="ellipse">
+              <a:avLst/>
+            </a:prstGeom>
+            <a:solidFill>
+              <a:schemeClr val="bg1"/>
+            </a:solidFill>
+            <a:ln w="12700" cmpd="sng">
+              <a:solidFill>
+                <a:srgbClr val="000000"/>
+              </a:solidFill>
+            </a:ln>
+            <a:effectLst/>
+          </p:spPr>
+          <p:style>
+            <a:lnRef idx="1">
+              <a:schemeClr val="accent1"/>
+            </a:lnRef>
+            <a:fillRef idx="3">
+              <a:schemeClr val="accent1"/>
+            </a:fillRef>
+            <a:effectRef idx="2">
+              <a:schemeClr val="accent1"/>
+            </a:effectRef>
+            <a:fontRef idx="minor">
+              <a:schemeClr val="lt1"/>
+            </a:fontRef>
+          </p:style>
+          <p:txBody>
+            <a:bodyPr rtlCol="0" anchor="ctr"/>
+            <a:lstStyle/>
+            <a:p>
+              <a:pPr algn="ctr"/>
+              <a:endParaRPr lang="en-US">
+                <a:latin typeface="Helvetica"/>
+                <a:cs typeface="Helvetica"/>
+              </a:endParaRPr>
+            </a:p>
+          </p:txBody>
+        </p:sp>
+        <p:sp>
+          <p:nvSpPr>
+            <p:cNvPr id="50" name="TextBox 49"/>
+            <p:cNvSpPr txBox="1"/>
+            <p:nvPr/>
+          </p:nvSpPr>
+          <p:spPr>
+            <a:xfrm>
+              <a:off x="2536794" y="6506856"/>
+              <a:ext cx="441334" cy="246221"/>
+            </a:xfrm>
+            <a:prstGeom prst="rect">
+              <a:avLst/>
+            </a:prstGeom>
+            <a:noFill/>
+          </p:spPr>
+          <p:txBody>
+            <a:bodyPr wrap="none" rtlCol="0">
+              <a:spAutoFit/>
+            </a:bodyPr>
+            <a:lstStyle/>
+            <a:p>
+              <a:pPr algn="ctr"/>
+              <a:r>
+                <a:rPr lang="en-US" sz="1000" dirty="0" smtClean="0">
+                  <a:latin typeface="Helvetica"/>
+                  <a:cs typeface="Helvetica"/>
+                </a:rPr>
+                <a:t>29%</a:t>
+              </a:r>
+              <a:endParaRPr lang="en-US" sz="1000" dirty="0">
+                <a:latin typeface="Helvetica"/>
+                <a:cs typeface="Helvetica"/>
+              </a:endParaRPr>
+            </a:p>
+          </p:txBody>
+        </p:sp>
+        <p:sp>
+          <p:nvSpPr>
+            <p:cNvPr id="51" name="TextBox 50"/>
+            <p:cNvSpPr txBox="1"/>
+            <p:nvPr/>
+          </p:nvSpPr>
+          <p:spPr>
+            <a:xfrm>
+              <a:off x="4078637" y="6514269"/>
+              <a:ext cx="370013" cy="246221"/>
+            </a:xfrm>
+            <a:prstGeom prst="rect">
+              <a:avLst/>
+            </a:prstGeom>
+            <a:noFill/>
+          </p:spPr>
+          <p:txBody>
+            <a:bodyPr wrap="none" rtlCol="0">
+              <a:spAutoFit/>
+            </a:bodyPr>
+            <a:lstStyle/>
+            <a:p>
+              <a:pPr algn="ctr"/>
+              <a:r>
+                <a:rPr lang="en-US" sz="1000" dirty="0">
+                  <a:latin typeface="Helvetica"/>
+                  <a:cs typeface="Helvetica"/>
+                </a:rPr>
+                <a:t>2</a:t>
+              </a:r>
+              <a:r>
+                <a:rPr lang="en-US" sz="1000" dirty="0" smtClean="0">
+                  <a:latin typeface="Helvetica"/>
+                  <a:cs typeface="Helvetica"/>
+                </a:rPr>
+                <a:t>%</a:t>
+              </a:r>
+              <a:endParaRPr lang="en-US" sz="1000" dirty="0">
+                <a:latin typeface="Helvetica"/>
+                <a:cs typeface="Helvetica"/>
+              </a:endParaRPr>
+            </a:p>
+          </p:txBody>
+        </p:sp>
+        <p:cxnSp>
+          <p:nvCxnSpPr>
+            <p:cNvPr id="52" name="Straight Connector 51"/>
+            <p:cNvCxnSpPr/>
+            <p:nvPr/>
+          </p:nvCxnSpPr>
+          <p:spPr>
+            <a:xfrm>
+              <a:off x="4116340" y="6932415"/>
+              <a:ext cx="274320" cy="0"/>
+            </a:xfrm>
+            <a:prstGeom prst="line">
+              <a:avLst/>
+            </a:prstGeom>
+            <a:ln w="47625" cmpd="sng">
+              <a:solidFill>
+                <a:srgbClr val="676767"/>
+              </a:solidFill>
+            </a:ln>
+            <a:effectLst/>
+          </p:spPr>
+          <p:style>
+            <a:lnRef idx="2">
+              <a:schemeClr val="accent1"/>
+            </a:lnRef>
+            <a:fillRef idx="0">
+              <a:schemeClr val="accent1"/>
+            </a:fillRef>
+            <a:effectRef idx="1">
+              <a:schemeClr val="accent1"/>
+            </a:effectRef>
+            <a:fontRef idx="minor">
+              <a:schemeClr val="tx1"/>
+            </a:fontRef>
+          </p:style>
+        </p:cxnSp>
+      </p:grpSp>
+      <p:sp>
+        <p:nvSpPr>
+          <p:cNvPr id="53" name="TextBox 52"/>
+          <p:cNvSpPr txBox="1"/>
+          <p:nvPr/>
+        </p:nvSpPr>
+        <p:spPr>
+          <a:xfrm>
+            <a:off x="2985072" y="2855708"/>
+            <a:ext cx="1827018" cy="276999"/>
+          </a:xfrm>
+          <a:prstGeom prst="rect">
+            <a:avLst/>
+          </a:prstGeom>
+          <a:noFill/>
+        </p:spPr>
+        <p:txBody>
+          <a:bodyPr wrap="none" rtlCol="0">
+            <a:spAutoFit/>
+          </a:bodyPr>
+          <a:lstStyle/>
+          <a:p>
+            <a:r>
+              <a:rPr lang="en-US" sz="1200" dirty="0">
+                <a:latin typeface="Helvetica"/>
+                <a:cs typeface="Helvetica"/>
+              </a:rPr>
+              <a:t>D</a:t>
+            </a:r>
+            <a:r>
+              <a:rPr lang="en-US" sz="1200" dirty="0" smtClean="0">
+                <a:latin typeface="Helvetica"/>
+                <a:cs typeface="Helvetica"/>
+              </a:rPr>
+              <a:t>. Discounted damages</a:t>
+            </a:r>
+            <a:endParaRPr lang="en-US" sz="1200" dirty="0">
+              <a:latin typeface="Helvetica"/>
+              <a:cs typeface="Helvetica"/>
+            </a:endParaRPr>
+          </a:p>
+        </p:txBody>
+      </p:sp>
+      <p:pic>
+        <p:nvPicPr>
+          <p:cNvPr id="58" name="Picture 57"/>
+          <p:cNvPicPr>
+            <a:picLocks noChangeAspect="1"/>
+          </p:cNvPicPr>
+          <p:nvPr/>
+        </p:nvPicPr>
+        <p:blipFill rotWithShape="1">
+          <a:blip r:embed="rId2">
+            <a:extLst>
+              <a:ext uri="{28A0092B-C50C-407E-A947-70E740481C1C}">
+                <a14:useLocalDpi xmlns:a14="http://schemas.microsoft.com/office/drawing/2010/main" val="0"/>
+              </a:ext>
+            </a:extLst>
+          </a:blip>
+          <a:srcRect l="23091" t="15090" r="17818" b="30727"/>
+          <a:stretch/>
+        </p:blipFill>
+        <p:spPr>
+          <a:xfrm>
+            <a:off x="-49912" y="159081"/>
+            <a:ext cx="2852131" cy="2615184"/>
+          </a:xfrm>
+          <a:prstGeom prst="rect">
+            <a:avLst/>
+          </a:prstGeom>
+        </p:spPr>
+      </p:pic>
+      <p:pic>
+        <p:nvPicPr>
+          <p:cNvPr id="60" name="Picture 59"/>
+          <p:cNvPicPr>
+            <a:picLocks noChangeAspect="1"/>
+          </p:cNvPicPr>
+          <p:nvPr/>
+        </p:nvPicPr>
+        <p:blipFill rotWithShape="1">
+          <a:blip r:embed="rId3">
+            <a:extLst>
+              <a:ext uri="{28A0092B-C50C-407E-A947-70E740481C1C}">
+                <a14:useLocalDpi xmlns:a14="http://schemas.microsoft.com/office/drawing/2010/main" val="0"/>
+              </a:ext>
+            </a:extLst>
+          </a:blip>
+          <a:srcRect l="23273" t="15090" r="17818" b="30182"/>
+          <a:stretch/>
+        </p:blipFill>
+        <p:spPr>
+          <a:xfrm>
+            <a:off x="2836889" y="159081"/>
+            <a:ext cx="2815014" cy="2615184"/>
+          </a:xfrm>
+          <a:prstGeom prst="rect">
+            <a:avLst/>
+          </a:prstGeom>
+        </p:spPr>
+      </p:pic>
+      <p:pic>
+        <p:nvPicPr>
+          <p:cNvPr id="61" name="Picture 60"/>
+          <p:cNvPicPr>
+            <a:picLocks noChangeAspect="1"/>
+          </p:cNvPicPr>
+          <p:nvPr/>
+        </p:nvPicPr>
+        <p:blipFill rotWithShape="1">
+          <a:blip r:embed="rId4">
+            <a:extLst>
+              <a:ext uri="{28A0092B-C50C-407E-A947-70E740481C1C}">
+                <a14:useLocalDpi xmlns:a14="http://schemas.microsoft.com/office/drawing/2010/main" val="0"/>
+              </a:ext>
+            </a:extLst>
+          </a:blip>
+          <a:srcRect l="22727" t="14909" r="17636" b="30545"/>
+          <a:stretch/>
+        </p:blipFill>
+        <p:spPr>
+          <a:xfrm>
+            <a:off x="-60670" y="3081528"/>
+            <a:ext cx="2859267" cy="2615184"/>
+          </a:xfrm>
+          <a:prstGeom prst="rect">
+            <a:avLst/>
+          </a:prstGeom>
+        </p:spPr>
+      </p:pic>
+      <p:pic>
+        <p:nvPicPr>
+          <p:cNvPr id="63" name="Picture 62"/>
+          <p:cNvPicPr>
+            <a:picLocks noChangeAspect="1"/>
+          </p:cNvPicPr>
+          <p:nvPr/>
+        </p:nvPicPr>
+        <p:blipFill rotWithShape="1">
+          <a:blip r:embed="rId5">
+            <a:extLst>
+              <a:ext uri="{28A0092B-C50C-407E-A947-70E740481C1C}">
+                <a14:useLocalDpi xmlns:a14="http://schemas.microsoft.com/office/drawing/2010/main" val="0"/>
+              </a:ext>
+            </a:extLst>
+          </a:blip>
+          <a:srcRect l="22909" t="15090" r="17637" b="30364"/>
+          <a:stretch/>
+        </p:blipFill>
+        <p:spPr>
+          <a:xfrm>
+            <a:off x="2862412" y="3094254"/>
+            <a:ext cx="2850550" cy="2615184"/>
+          </a:xfrm>
+          <a:prstGeom prst="rect">
+            <a:avLst/>
+          </a:prstGeom>
+        </p:spPr>
+      </p:pic>
+    </p:spTree>
+    <p:extLst>
+      <p:ext uri="{BB962C8B-B14F-4D97-AF65-F5344CB8AC3E}">
+        <p14:creationId xmlns:p14="http://schemas.microsoft.com/office/powerpoint/2010/main" val="4106294354"/>
+      </p:ext>
+    </p:extLst>
+  </p:cSld>
+  <p:clrMapOvr>
+    <a:masterClrMapping/>
+  </p:clrMapOvr>
+</p:sld>
+</file>
+
+<file path=ppt/slides/slide4.xml><?xml version="1.0" encoding="utf-8"?>
+<p:sld xmlns:a="http://schemas.openxmlformats.org/drawingml/2006/main" xmlns:r="http://schemas.openxmlformats.org/officeDocument/2006/relationships" xmlns:p="http://schemas.openxmlformats.org/presentationml/2006/main">
+  <p:cSld>
+    <p:spTree>
+      <p:nvGrpSpPr>
+        <p:cNvPr id="1" name=""/>
+        <p:cNvGrpSpPr/>
+        <p:nvPr/>
+      </p:nvGrpSpPr>
+      <p:grpSpPr>
+        <a:xfrm>
+          <a:off x="0" y="0"/>
+          <a:ext cx="0" cy="0"/>
+          <a:chOff x="0" y="0"/>
+          <a:chExt cx="0" cy="0"/>
+        </a:xfrm>
+      </p:grpSpPr>
+      <p:pic>
+        <p:nvPicPr>
+          <p:cNvPr id="2" name="Picture 1"/>
+          <p:cNvPicPr>
+            <a:picLocks noChangeAspect="1"/>
+          </p:cNvPicPr>
+          <p:nvPr/>
+        </p:nvPicPr>
+        <p:blipFill rotWithShape="1">
+          <a:blip r:embed="rId2">
+            <a:extLst>
+              <a:ext uri="{28A0092B-C50C-407E-A947-70E740481C1C}">
+                <a14:useLocalDpi xmlns:a14="http://schemas.microsoft.com/office/drawing/2010/main" val="0"/>
+              </a:ext>
+            </a:extLst>
+          </a:blip>
+          <a:srcRect l="22727" t="14909" r="17636" b="30545"/>
+          <a:stretch/>
+        </p:blipFill>
+        <p:spPr>
+          <a:xfrm>
+            <a:off x="311729" y="3636818"/>
+            <a:ext cx="2859267" cy="2615184"/>
+          </a:xfrm>
+          <a:prstGeom prst="rect">
+            <a:avLst/>
+          </a:prstGeom>
+        </p:spPr>
+      </p:pic>
+      <p:pic>
+        <p:nvPicPr>
+          <p:cNvPr id="3" name="Picture 2"/>
+          <p:cNvPicPr>
+            <a:picLocks noChangeAspect="1"/>
+          </p:cNvPicPr>
+          <p:nvPr/>
+        </p:nvPicPr>
+        <p:blipFill rotWithShape="1">
+          <a:blip r:embed="rId3">
+            <a:extLst>
+              <a:ext uri="{28A0092B-C50C-407E-A947-70E740481C1C}">
+                <a14:useLocalDpi xmlns:a14="http://schemas.microsoft.com/office/drawing/2010/main" val="0"/>
+              </a:ext>
+            </a:extLst>
+          </a:blip>
+          <a:srcRect l="22909" t="15090" r="17637" b="30364"/>
+          <a:stretch/>
+        </p:blipFill>
+        <p:spPr>
+          <a:xfrm>
+            <a:off x="4572002" y="4197926"/>
+            <a:ext cx="2850550" cy="2615184"/>
+          </a:xfrm>
+          <a:prstGeom prst="rect">
+            <a:avLst/>
+          </a:prstGeom>
+        </p:spPr>
+      </p:pic>
+      <p:pic>
+        <p:nvPicPr>
+          <p:cNvPr id="4" name="Picture 3"/>
+          <p:cNvPicPr>
+            <a:picLocks noChangeAspect="1"/>
+          </p:cNvPicPr>
+          <p:nvPr/>
+        </p:nvPicPr>
+        <p:blipFill rotWithShape="1">
+          <a:blip r:embed="rId4">
+            <a:extLst>
+              <a:ext uri="{28A0092B-C50C-407E-A947-70E740481C1C}">
+                <a14:useLocalDpi xmlns:a14="http://schemas.microsoft.com/office/drawing/2010/main" val="0"/>
+              </a:ext>
+            </a:extLst>
+          </a:blip>
+          <a:srcRect l="23273" t="15090" r="17818" b="30182"/>
+          <a:stretch/>
+        </p:blipFill>
+        <p:spPr>
+          <a:xfrm>
+            <a:off x="2847109" y="301335"/>
+            <a:ext cx="2815014" cy="2615184"/>
+          </a:xfrm>
+          <a:prstGeom prst="rect">
+            <a:avLst/>
+          </a:prstGeom>
+        </p:spPr>
+      </p:pic>
+    </p:spTree>
+    <p:extLst>
+      <p:ext uri="{BB962C8B-B14F-4D97-AF65-F5344CB8AC3E}">
+        <p14:creationId xmlns:p14="http://schemas.microsoft.com/office/powerpoint/2010/main" val="3393773"/>
       </p:ext>
     </p:extLst>
   </p:cSld>

</xml_diff>